<commit_message>
clean-up and move temp files
</commit_message>
<xml_diff>
--- a/covid19/presentation.pptx
+++ b/covid19/presentation.pptx
@@ -6055,7 +6055,47 @@
             </a:pPr>
             <a:r>
               <a:rPr/>
-              <a:t>qwewr</a:t>
+              <a:t>Estimates</a:t>
+            </a:r>
+            <a:r>
+              <a:rPr/>
+              <a:t> </a:t>
+            </a:r>
+            <a:r>
+              <a:rPr/>
+              <a:t>of</a:t>
+            </a:r>
+            <a:r>
+              <a:rPr/>
+              <a:t> </a:t>
+            </a:r>
+            <a:r>
+              <a:rPr/>
+              <a:t>Covid-19</a:t>
+            </a:r>
+            <a:r>
+              <a:rPr/>
+              <a:t> </a:t>
+            </a:r>
+            <a:r>
+              <a:rPr/>
+              <a:t>Impact</a:t>
+            </a:r>
+            <a:r>
+              <a:rPr/>
+              <a:t> </a:t>
+            </a:r>
+            <a:r>
+              <a:rPr/>
+              <a:t>for</a:t>
+            </a:r>
+            <a:r>
+              <a:rPr/>
+              <a:t> </a:t>
+            </a:r>
+            <a:r>
+              <a:rPr/>
+              <a:t>Singapore</a:t>
             </a:r>
             <a:br/>
             <a:br/>
@@ -6086,7 +6126,7 @@
             </a:pPr>
             <a:r>
               <a:rPr/>
-              <a:t>15</a:t>
+              <a:t>5th</a:t>
             </a:r>
             <a:r>
               <a:rPr/>
@@ -6094,7 +6134,7 @@
             </a:r>
             <a:r>
               <a:rPr/>
-              <a:t>Apr</a:t>
+              <a:t>March</a:t>
             </a:r>
             <a:r>
               <a:rPr/>
@@ -7168,7 +7208,7 @@
             <a:pPr lvl="1"/>
             <a:r>
               <a:rPr/>
-              <a:t>qwewr</a:t>
+              <a:t>Estimates of Covid-19 Impact for Singapore</a:t>
             </a:r>
           </a:p>
         </p:txBody>

</xml_diff>